<commit_message>
add detail work and pdf
</commit_message>
<xml_diff>
--- a/Nhóm 19 _ Phân Tích Dữ Liệu Cryptocurrency Historical Prices_IE221.pptx
+++ b/Nhóm 19 _ Phân Tích Dữ Liệu Cryptocurrency Historical Prices_IE221.pptx
@@ -8,8 +8,8 @@
     <p:sldId id="256" r:id="rId2"/>
     <p:sldId id="257" r:id="rId3"/>
     <p:sldId id="258" r:id="rId4"/>
-    <p:sldId id="259" r:id="rId5"/>
-    <p:sldId id="265" r:id="rId6"/>
+    <p:sldId id="265" r:id="rId5"/>
+    <p:sldId id="259" r:id="rId6"/>
     <p:sldId id="266" r:id="rId7"/>
   </p:sldIdLst>
   <p:sldSz cx="12192000" cy="6858000"/>
@@ -127,6 +127,22 @@
 
 <file path=ppt/changesInfos/changesInfo1.xml><?xml version="1.0" encoding="utf-8"?>
 <pc:chgInfo xmlns:a="http://schemas.openxmlformats.org/drawingml/2006/main" xmlns:r="http://schemas.openxmlformats.org/officeDocument/2006/relationships" xmlns:ac="http://schemas.microsoft.com/office/drawing/2013/main/command" xmlns:pc="http://schemas.microsoft.com/office/powerpoint/2013/main/command">
+  <pc:docChgLst>
+    <pc:chgData name="Near San" userId="20825bfb6541c832" providerId="LiveId" clId="{FD12EE36-1D3E-4BB0-BB7A-2720D6C0BC8C}"/>
+    <pc:docChg chg="modSld sldOrd">
+      <pc:chgData name="Near San" userId="20825bfb6541c832" providerId="LiveId" clId="{FD12EE36-1D3E-4BB0-BB7A-2720D6C0BC8C}" dt="2022-05-20T03:35:32.874" v="1"/>
+      <pc:docMkLst>
+        <pc:docMk/>
+      </pc:docMkLst>
+      <pc:sldChg chg="ord">
+        <pc:chgData name="Near San" userId="20825bfb6541c832" providerId="LiveId" clId="{FD12EE36-1D3E-4BB0-BB7A-2720D6C0BC8C}" dt="2022-05-20T03:35:32.874" v="1"/>
+        <pc:sldMkLst>
+          <pc:docMk/>
+          <pc:sldMk cId="1128982363" sldId="259"/>
+        </pc:sldMkLst>
+      </pc:sldChg>
+    </pc:docChg>
+  </pc:docChgLst>
   <pc:docChgLst>
     <pc:chgData name="Near San" userId="20825bfb6541c832" providerId="LiveId" clId="{B3F56679-35AB-4264-A946-65F86D16FD1A}"/>
     <pc:docChg chg="undo redo custSel addSld delSld modSld sldOrd addMainMaster delMainMaster">
@@ -10115,6 +10131,569 @@
       </p:grpSpPr>
       <p:sp useBgFill="1">
         <p:nvSpPr>
+          <p:cNvPr id="135" name="Rectangle 134">
+            <a:extLst>
+              <a:ext uri="{FF2B5EF4-FFF2-40B4-BE49-F238E27FC236}">
+                <a16:creationId xmlns:a16="http://schemas.microsoft.com/office/drawing/2014/main" id="{CD62DB5A-5AA0-4E7E-94AB-AD20F02CA8DF}"/>
+              </a:ext>
+              <a:ext uri="{C183D7F6-B498-43B3-948B-1728B52AA6E4}">
+                <adec:decorative xmlns:adec="http://schemas.microsoft.com/office/drawing/2017/decorative" val="1"/>
+              </a:ext>
+            </a:extLst>
+          </p:cNvPr>
+          <p:cNvSpPr>
+            <a:spLocks noGrp="1" noRot="1" noChangeAspect="1" noMove="1" noResize="1" noEditPoints="1" noAdjustHandles="1" noChangeArrowheads="1" noChangeShapeType="1" noTextEdit="1"/>
+          </p:cNvSpPr>
+          <p:nvPr>
+            <p:extLst>
+              <p:ext uri="{386F3935-93C4-4BCD-93E2-E3B085C9AB24}">
+                <p16:designElem xmlns:p16="http://schemas.microsoft.com/office/powerpoint/2015/main" val="1"/>
+              </p:ext>
+            </p:extLst>
+          </p:nvPr>
+        </p:nvSpPr>
+        <p:spPr>
+          <a:xfrm>
+            <a:off x="3048" y="0"/>
+            <a:ext cx="12188952" cy="6858000"/>
+          </a:xfrm>
+          <a:prstGeom prst="rect">
+            <a:avLst/>
+          </a:prstGeom>
+          <a:ln>
+            <a:noFill/>
+          </a:ln>
+        </p:spPr>
+        <p:style>
+          <a:lnRef idx="2">
+            <a:schemeClr val="accent1">
+              <a:shade val="50000"/>
+            </a:schemeClr>
+          </a:lnRef>
+          <a:fillRef idx="1">
+            <a:schemeClr val="accent1"/>
+          </a:fillRef>
+          <a:effectRef idx="0">
+            <a:schemeClr val="accent1"/>
+          </a:effectRef>
+          <a:fontRef idx="minor">
+            <a:schemeClr val="lt1"/>
+          </a:fontRef>
+        </p:style>
+        <p:txBody>
+          <a:bodyPr rtlCol="0" anchor="ctr"/>
+          <a:lstStyle/>
+          <a:p>
+            <a:pPr algn="ctr"/>
+            <a:endParaRPr lang="en-US" sz="900" dirty="0">
+              <a:solidFill>
+                <a:schemeClr val="bg1"/>
+              </a:solidFill>
+              <a:latin typeface="+mj-lt"/>
+            </a:endParaRPr>
+          </a:p>
+        </p:txBody>
+      </p:sp>
+      <p:sp>
+        <p:nvSpPr>
+          <p:cNvPr id="137" name="Rectangle 136">
+            <a:extLst>
+              <a:ext uri="{FF2B5EF4-FFF2-40B4-BE49-F238E27FC236}">
+                <a16:creationId xmlns:a16="http://schemas.microsoft.com/office/drawing/2014/main" id="{0F086ECE-EF43-4B07-9DD0-59679471A067}"/>
+              </a:ext>
+              <a:ext uri="{C183D7F6-B498-43B3-948B-1728B52AA6E4}">
+                <adec:decorative xmlns:adec="http://schemas.microsoft.com/office/drawing/2017/decorative" val="1"/>
+              </a:ext>
+            </a:extLst>
+          </p:cNvPr>
+          <p:cNvSpPr>
+            <a:spLocks noGrp="1" noRot="1" noChangeAspect="1" noMove="1" noResize="1" noEditPoints="1" noAdjustHandles="1" noChangeArrowheads="1" noChangeShapeType="1" noTextEdit="1"/>
+          </p:cNvSpPr>
+          <p:nvPr>
+            <p:extLst>
+              <p:ext uri="{386F3935-93C4-4BCD-93E2-E3B085C9AB24}">
+                <p16:designElem xmlns:p16="http://schemas.microsoft.com/office/powerpoint/2015/main" val="1"/>
+              </p:ext>
+            </p:extLst>
+          </p:nvPr>
+        </p:nvSpPr>
+        <p:spPr>
+          <a:xfrm>
+            <a:off x="3048" y="0"/>
+            <a:ext cx="12188952" cy="6858000"/>
+          </a:xfrm>
+          <a:prstGeom prst="rect">
+            <a:avLst/>
+          </a:prstGeom>
+          <a:solidFill>
+            <a:schemeClr val="bg2">
+              <a:lumMod val="90000"/>
+              <a:lumOff val="10000"/>
+              <a:alpha val="90000"/>
+            </a:schemeClr>
+          </a:solidFill>
+          <a:ln>
+            <a:noFill/>
+          </a:ln>
+        </p:spPr>
+        <p:style>
+          <a:lnRef idx="2">
+            <a:schemeClr val="accent1">
+              <a:shade val="50000"/>
+            </a:schemeClr>
+          </a:lnRef>
+          <a:fillRef idx="1">
+            <a:schemeClr val="accent1"/>
+          </a:fillRef>
+          <a:effectRef idx="0">
+            <a:schemeClr val="accent1"/>
+          </a:effectRef>
+          <a:fontRef idx="minor">
+            <a:schemeClr val="lt1"/>
+          </a:fontRef>
+        </p:style>
+        <p:txBody>
+          <a:bodyPr rtlCol="0" anchor="ctr"/>
+          <a:lstStyle/>
+          <a:p>
+            <a:pPr algn="ctr"/>
+            <a:endParaRPr lang="en-US" sz="900" dirty="0">
+              <a:solidFill>
+                <a:schemeClr val="bg1"/>
+              </a:solidFill>
+              <a:latin typeface="+mj-lt"/>
+            </a:endParaRPr>
+          </a:p>
+        </p:txBody>
+      </p:sp>
+      <p:sp useBgFill="1">
+        <p:nvSpPr>
+          <p:cNvPr id="139" name="Rectangle 138">
+            <a:extLst>
+              <a:ext uri="{FF2B5EF4-FFF2-40B4-BE49-F238E27FC236}">
+                <a16:creationId xmlns:a16="http://schemas.microsoft.com/office/drawing/2014/main" id="{5DB84597-3185-4C7A-A2CB-6413E167EE86}"/>
+              </a:ext>
+              <a:ext uri="{C183D7F6-B498-43B3-948B-1728B52AA6E4}">
+                <adec:decorative xmlns:adec="http://schemas.microsoft.com/office/drawing/2017/decorative" val="1"/>
+              </a:ext>
+            </a:extLst>
+          </p:cNvPr>
+          <p:cNvSpPr>
+            <a:spLocks noGrp="1" noRot="1" noChangeAspect="1" noMove="1" noResize="1" noEditPoints="1" noAdjustHandles="1" noChangeArrowheads="1" noChangeShapeType="1" noTextEdit="1"/>
+          </p:cNvSpPr>
+          <p:nvPr>
+            <p:extLst>
+              <p:ext uri="{386F3935-93C4-4BCD-93E2-E3B085C9AB24}">
+                <p16:designElem xmlns:p16="http://schemas.microsoft.com/office/powerpoint/2015/main" val="1"/>
+              </p:ext>
+            </p:extLst>
+          </p:nvPr>
+        </p:nvSpPr>
+        <p:spPr>
+          <a:xfrm>
+            <a:off x="3048" y="0"/>
+            <a:ext cx="12188952" cy="6858000"/>
+          </a:xfrm>
+          <a:prstGeom prst="rect">
+            <a:avLst/>
+          </a:prstGeom>
+          <a:ln>
+            <a:noFill/>
+          </a:ln>
+        </p:spPr>
+        <p:style>
+          <a:lnRef idx="2">
+            <a:schemeClr val="accent1">
+              <a:shade val="50000"/>
+            </a:schemeClr>
+          </a:lnRef>
+          <a:fillRef idx="1">
+            <a:schemeClr val="accent1"/>
+          </a:fillRef>
+          <a:effectRef idx="0">
+            <a:schemeClr val="accent1"/>
+          </a:effectRef>
+          <a:fontRef idx="minor">
+            <a:schemeClr val="lt1"/>
+          </a:fontRef>
+        </p:style>
+        <p:txBody>
+          <a:bodyPr rtlCol="0" anchor="ctr"/>
+          <a:lstStyle/>
+          <a:p>
+            <a:pPr algn="ctr"/>
+            <a:endParaRPr lang="en-US" sz="900" dirty="0">
+              <a:solidFill>
+                <a:schemeClr val="bg1"/>
+              </a:solidFill>
+              <a:latin typeface="+mj-lt"/>
+            </a:endParaRPr>
+          </a:p>
+        </p:txBody>
+      </p:sp>
+      <p:sp useBgFill="1">
+        <p:nvSpPr>
+          <p:cNvPr id="141" name="Rectangle 140">
+            <a:extLst>
+              <a:ext uri="{FF2B5EF4-FFF2-40B4-BE49-F238E27FC236}">
+                <a16:creationId xmlns:a16="http://schemas.microsoft.com/office/drawing/2014/main" id="{94DA0203-BFB4-49DB-A205-51AD7549D42A}"/>
+              </a:ext>
+              <a:ext uri="{C183D7F6-B498-43B3-948B-1728B52AA6E4}">
+                <adec:decorative xmlns:adec="http://schemas.microsoft.com/office/drawing/2017/decorative" val="1"/>
+              </a:ext>
+            </a:extLst>
+          </p:cNvPr>
+          <p:cNvSpPr>
+            <a:spLocks noGrp="1" noRot="1" noChangeAspect="1" noMove="1" noResize="1" noEditPoints="1" noAdjustHandles="1" noChangeArrowheads="1" noChangeShapeType="1" noTextEdit="1"/>
+          </p:cNvSpPr>
+          <p:nvPr>
+            <p:extLst>
+              <p:ext uri="{386F3935-93C4-4BCD-93E2-E3B085C9AB24}">
+                <p16:designElem xmlns:p16="http://schemas.microsoft.com/office/powerpoint/2015/main" val="1"/>
+              </p:ext>
+            </p:extLst>
+          </p:nvPr>
+        </p:nvSpPr>
+        <p:spPr>
+          <a:xfrm>
+            <a:off x="0" y="0"/>
+            <a:ext cx="12192000" cy="6858000"/>
+          </a:xfrm>
+          <a:prstGeom prst="rect">
+            <a:avLst/>
+          </a:prstGeom>
+          <a:ln>
+            <a:noFill/>
+          </a:ln>
+        </p:spPr>
+        <p:style>
+          <a:lnRef idx="2">
+            <a:schemeClr val="accent1">
+              <a:shade val="50000"/>
+            </a:schemeClr>
+          </a:lnRef>
+          <a:fillRef idx="1">
+            <a:schemeClr val="accent1"/>
+          </a:fillRef>
+          <a:effectRef idx="0">
+            <a:schemeClr val="accent1"/>
+          </a:effectRef>
+          <a:fontRef idx="minor">
+            <a:schemeClr val="lt1"/>
+          </a:fontRef>
+        </p:style>
+        <p:txBody>
+          <a:bodyPr rtlCol="0" anchor="ctr"/>
+          <a:lstStyle/>
+          <a:p>
+            <a:pPr algn="ctr"/>
+            <a:endParaRPr lang="en-US" dirty="0">
+              <a:solidFill>
+                <a:schemeClr val="tx1">
+                  <a:lumMod val="65000"/>
+                  <a:lumOff val="35000"/>
+                </a:schemeClr>
+              </a:solidFill>
+              <a:latin typeface="AvenirNext LT Pro Medium" panose="020B0504020202020204" pitchFamily="34" charset="0"/>
+            </a:endParaRPr>
+          </a:p>
+        </p:txBody>
+      </p:sp>
+      <p:pic>
+        <p:nvPicPr>
+          <p:cNvPr id="1026" name="Picture 2" descr="Điểm danh top 5 phần mềm phân tích chứng khoán">
+            <a:extLst>
+              <a:ext uri="{FF2B5EF4-FFF2-40B4-BE49-F238E27FC236}">
+                <a16:creationId xmlns:a16="http://schemas.microsoft.com/office/drawing/2014/main" id="{0A431F1E-813C-99B8-B790-7CF6D4CC97EC}"/>
+              </a:ext>
+            </a:extLst>
+          </p:cNvPr>
+          <p:cNvPicPr>
+            <a:picLocks noChangeAspect="1" noChangeArrowheads="1"/>
+          </p:cNvPicPr>
+          <p:nvPr/>
+        </p:nvPicPr>
+        <p:blipFill rotWithShape="1">
+          <a:blip r:embed="rId2">
+            <a:alphaModFix/>
+            <a:extLst>
+              <a:ext uri="{28A0092B-C50C-407E-A947-70E740481C1C}">
+                <a14:useLocalDpi xmlns:a14="http://schemas.microsoft.com/office/drawing/2010/main" val="0"/>
+              </a:ext>
+            </a:extLst>
+          </a:blip>
+          <a:srcRect l="44"/>
+          <a:stretch/>
+        </p:blipFill>
+        <p:spPr bwMode="auto">
+          <a:xfrm>
+            <a:off x="5355" y="10"/>
+            <a:ext cx="12186645" cy="6857990"/>
+          </a:xfrm>
+          <a:prstGeom prst="rect">
+            <a:avLst/>
+          </a:prstGeom>
+          <a:noFill/>
+          <a:extLst>
+            <a:ext uri="{909E8E84-426E-40DD-AFC4-6F175D3DCCD1}">
+              <a14:hiddenFill xmlns:a14="http://schemas.microsoft.com/office/drawing/2010/main">
+                <a:solidFill>
+                  <a:srgbClr val="FFFFFF"/>
+                </a:solidFill>
+              </a14:hiddenFill>
+            </a:ext>
+          </a:extLst>
+        </p:spPr>
+      </p:pic>
+      <p:sp>
+        <p:nvSpPr>
+          <p:cNvPr id="143" name="Rectangle 142">
+            <a:extLst>
+              <a:ext uri="{FF2B5EF4-FFF2-40B4-BE49-F238E27FC236}">
+                <a16:creationId xmlns:a16="http://schemas.microsoft.com/office/drawing/2014/main" id="{652F1BB8-9F6C-45D6-898D-65348D26BFCC}"/>
+              </a:ext>
+              <a:ext uri="{C183D7F6-B498-43B3-948B-1728B52AA6E4}">
+                <adec:decorative xmlns:adec="http://schemas.microsoft.com/office/drawing/2017/decorative" val="1"/>
+              </a:ext>
+            </a:extLst>
+          </p:cNvPr>
+          <p:cNvSpPr>
+            <a:spLocks noGrp="1" noRot="1" noChangeAspect="1" noMove="1" noResize="1" noEditPoints="1" noAdjustHandles="1" noChangeArrowheads="1" noChangeShapeType="1" noTextEdit="1"/>
+          </p:cNvSpPr>
+          <p:nvPr>
+            <p:extLst>
+              <p:ext uri="{386F3935-93C4-4BCD-93E2-E3B085C9AB24}">
+                <p16:designElem xmlns:p16="http://schemas.microsoft.com/office/powerpoint/2015/main" val="1"/>
+              </p:ext>
+            </p:extLst>
+          </p:nvPr>
+        </p:nvSpPr>
+        <p:spPr>
+          <a:xfrm>
+            <a:off x="3048" y="0"/>
+            <a:ext cx="12188952" cy="4934465"/>
+          </a:xfrm>
+          <a:prstGeom prst="rect">
+            <a:avLst/>
+          </a:prstGeom>
+          <a:gradFill>
+            <a:gsLst>
+              <a:gs pos="100000">
+                <a:srgbClr val="000000">
+                  <a:alpha val="0"/>
+                </a:srgbClr>
+              </a:gs>
+              <a:gs pos="0">
+                <a:schemeClr val="tx1"/>
+              </a:gs>
+              <a:gs pos="0">
+                <a:srgbClr val="000000">
+                  <a:alpha val="70000"/>
+                </a:srgbClr>
+              </a:gs>
+            </a:gsLst>
+            <a:lin ang="5400000" scaled="1"/>
+          </a:gradFill>
+          <a:ln>
+            <a:noFill/>
+          </a:ln>
+        </p:spPr>
+        <p:style>
+          <a:lnRef idx="2">
+            <a:schemeClr val="accent1">
+              <a:shade val="50000"/>
+            </a:schemeClr>
+          </a:lnRef>
+          <a:fillRef idx="1">
+            <a:schemeClr val="accent1"/>
+          </a:fillRef>
+          <a:effectRef idx="0">
+            <a:schemeClr val="accent1"/>
+          </a:effectRef>
+          <a:fontRef idx="minor">
+            <a:schemeClr val="lt1"/>
+          </a:fontRef>
+        </p:style>
+        <p:txBody>
+          <a:bodyPr rtlCol="0" anchor="ctr"/>
+          <a:lstStyle/>
+          <a:p>
+            <a:pPr algn="ctr"/>
+            <a:endParaRPr lang="en-US"/>
+          </a:p>
+        </p:txBody>
+      </p:sp>
+      <p:sp>
+        <p:nvSpPr>
+          <p:cNvPr id="2" name="Title 1">
+            <a:extLst>
+              <a:ext uri="{FF2B5EF4-FFF2-40B4-BE49-F238E27FC236}">
+                <a16:creationId xmlns:a16="http://schemas.microsoft.com/office/drawing/2014/main" id="{1271C3EB-EC29-59C7-8282-18B14EE0A947}"/>
+              </a:ext>
+            </a:extLst>
+          </p:cNvPr>
+          <p:cNvSpPr>
+            <a:spLocks noGrp="1"/>
+          </p:cNvSpPr>
+          <p:nvPr>
+            <p:ph type="title"/>
+          </p:nvPr>
+        </p:nvSpPr>
+        <p:spPr>
+          <a:xfrm>
+            <a:off x="777240" y="1143294"/>
+            <a:ext cx="9923708" cy="1020188"/>
+          </a:xfrm>
+        </p:spPr>
+        <p:txBody>
+          <a:bodyPr vert="horz" lIns="91440" tIns="45720" rIns="91440" bIns="45720" rtlCol="0" anchor="t">
+            <a:normAutofit/>
+          </a:bodyPr>
+          <a:lstStyle/>
+          <a:p>
+            <a:r>
+              <a:rPr lang="en-US" sz="6000">
+                <a:solidFill>
+                  <a:srgbClr val="FFFFFF"/>
+                </a:solidFill>
+              </a:rPr>
+              <a:t>App Tham Khảo</a:t>
+            </a:r>
+          </a:p>
+        </p:txBody>
+      </p:sp>
+    </p:spTree>
+    <p:extLst>
+      <p:ext uri="{BB962C8B-B14F-4D97-AF65-F5344CB8AC3E}">
+        <p14:creationId xmlns:p14="http://schemas.microsoft.com/office/powerpoint/2010/main" val="1941861796"/>
+      </p:ext>
+    </p:extLst>
+  </p:cSld>
+  <p:clrMapOvr>
+    <a:masterClrMapping/>
+  </p:clrMapOvr>
+  <p:timing>
+    <p:tnLst>
+      <p:par>
+        <p:cTn id="1" dur="indefinite" restart="never" nodeType="tmRoot">
+          <p:childTnLst>
+            <p:seq concurrent="1" nextAc="seek">
+              <p:cTn id="2" dur="indefinite" nodeType="mainSeq">
+                <p:childTnLst>
+                  <p:par>
+                    <p:cTn id="3" fill="hold">
+                      <p:stCondLst>
+                        <p:cond delay="indefinite"/>
+                        <p:cond evt="onBegin" delay="0">
+                          <p:tn val="2"/>
+                        </p:cond>
+                      </p:stCondLst>
+                      <p:childTnLst>
+                        <p:par>
+                          <p:cTn id="4" fill="hold">
+                            <p:stCondLst>
+                              <p:cond delay="0"/>
+                            </p:stCondLst>
+                            <p:childTnLst>
+                              <p:par>
+                                <p:cTn id="5" presetID="10" presetClass="entr" presetSubtype="0" fill="hold" grpId="0" nodeType="withEffect">
+                                  <p:stCondLst>
+                                    <p:cond delay="1000"/>
+                                  </p:stCondLst>
+                                  <p:iterate type="lt">
+                                    <p:tmPct val="10000"/>
+                                  </p:iterate>
+                                  <p:childTnLst>
+                                    <p:set>
+                                      <p:cBhvr>
+                                        <p:cTn id="6" dur="1" fill="hold">
+                                          <p:stCondLst>
+                                            <p:cond delay="0"/>
+                                          </p:stCondLst>
+                                        </p:cTn>
+                                        <p:tgtEl>
+                                          <p:spTgt spid="2"/>
+                                        </p:tgtEl>
+                                        <p:attrNameLst>
+                                          <p:attrName>style.visibility</p:attrName>
+                                        </p:attrNameLst>
+                                      </p:cBhvr>
+                                      <p:to>
+                                        <p:strVal val="visible"/>
+                                      </p:to>
+                                    </p:set>
+                                    <p:animEffect transition="in" filter="fade">
+                                      <p:cBhvr>
+                                        <p:cTn id="7" dur="400"/>
+                                        <p:tgtEl>
+                                          <p:spTgt spid="2"/>
+                                        </p:tgtEl>
+                                      </p:cBhvr>
+                                    </p:animEffect>
+                                  </p:childTnLst>
+                                </p:cTn>
+                              </p:par>
+                            </p:childTnLst>
+                          </p:cTn>
+                        </p:par>
+                      </p:childTnLst>
+                    </p:cTn>
+                  </p:par>
+                </p:childTnLst>
+              </p:cTn>
+              <p:prevCondLst>
+                <p:cond evt="onPrev" delay="0">
+                  <p:tgtEl>
+                    <p:sldTgt/>
+                  </p:tgtEl>
+                </p:cond>
+              </p:prevCondLst>
+              <p:nextCondLst>
+                <p:cond evt="onNext" delay="0">
+                  <p:tgtEl>
+                    <p:sldTgt/>
+                  </p:tgtEl>
+                </p:cond>
+              </p:nextCondLst>
+            </p:seq>
+          </p:childTnLst>
+        </p:cTn>
+      </p:par>
+    </p:tnLst>
+    <p:bldLst>
+      <p:bldP spid="2" grpId="0"/>
+    </p:bldLst>
+  </p:timing>
+</p:sld>
+</file>
+
+<file path=ppt/slides/slide5.xml><?xml version="1.0" encoding="utf-8"?>
+<p:sld xmlns:a="http://schemas.openxmlformats.org/drawingml/2006/main" xmlns:r="http://schemas.openxmlformats.org/officeDocument/2006/relationships" xmlns:p="http://schemas.openxmlformats.org/presentationml/2006/main">
+  <p:cSld>
+    <p:bg>
+      <p:bgPr>
+        <a:solidFill>
+          <a:schemeClr val="bg2"/>
+        </a:solidFill>
+        <a:effectLst/>
+      </p:bgPr>
+    </p:bg>
+    <p:spTree>
+      <p:nvGrpSpPr>
+        <p:cNvPr id="1" name=""/>
+        <p:cNvGrpSpPr/>
+        <p:nvPr/>
+      </p:nvGrpSpPr>
+      <p:grpSpPr>
+        <a:xfrm>
+          <a:off x="0" y="0"/>
+          <a:ext cx="0" cy="0"/>
+          <a:chOff x="0" y="0"/>
+          <a:chExt cx="0" cy="0"/>
+        </a:xfrm>
+      </p:grpSpPr>
+      <p:sp useBgFill="1">
+        <p:nvSpPr>
           <p:cNvPr id="40" name="Rectangle 39">
             <a:extLst>
               <a:ext uri="{FF2B5EF4-FFF2-40B4-BE49-F238E27FC236}">
@@ -10642,569 +11221,6 @@
                                     <p:animEffect transition="in" filter="fade">
                                       <p:cBhvr>
                                         <p:cTn id="7" dur="700"/>
-                                        <p:tgtEl>
-                                          <p:spTgt spid="2"/>
-                                        </p:tgtEl>
-                                      </p:cBhvr>
-                                    </p:animEffect>
-                                  </p:childTnLst>
-                                </p:cTn>
-                              </p:par>
-                            </p:childTnLst>
-                          </p:cTn>
-                        </p:par>
-                      </p:childTnLst>
-                    </p:cTn>
-                  </p:par>
-                </p:childTnLst>
-              </p:cTn>
-              <p:prevCondLst>
-                <p:cond evt="onPrev" delay="0">
-                  <p:tgtEl>
-                    <p:sldTgt/>
-                  </p:tgtEl>
-                </p:cond>
-              </p:prevCondLst>
-              <p:nextCondLst>
-                <p:cond evt="onNext" delay="0">
-                  <p:tgtEl>
-                    <p:sldTgt/>
-                  </p:tgtEl>
-                </p:cond>
-              </p:nextCondLst>
-            </p:seq>
-          </p:childTnLst>
-        </p:cTn>
-      </p:par>
-    </p:tnLst>
-    <p:bldLst>
-      <p:bldP spid="2" grpId="0"/>
-    </p:bldLst>
-  </p:timing>
-</p:sld>
-</file>
-
-<file path=ppt/slides/slide5.xml><?xml version="1.0" encoding="utf-8"?>
-<p:sld xmlns:a="http://schemas.openxmlformats.org/drawingml/2006/main" xmlns:r="http://schemas.openxmlformats.org/officeDocument/2006/relationships" xmlns:p="http://schemas.openxmlformats.org/presentationml/2006/main">
-  <p:cSld>
-    <p:bg>
-      <p:bgPr>
-        <a:solidFill>
-          <a:schemeClr val="bg2"/>
-        </a:solidFill>
-        <a:effectLst/>
-      </p:bgPr>
-    </p:bg>
-    <p:spTree>
-      <p:nvGrpSpPr>
-        <p:cNvPr id="1" name=""/>
-        <p:cNvGrpSpPr/>
-        <p:nvPr/>
-      </p:nvGrpSpPr>
-      <p:grpSpPr>
-        <a:xfrm>
-          <a:off x="0" y="0"/>
-          <a:ext cx="0" cy="0"/>
-          <a:chOff x="0" y="0"/>
-          <a:chExt cx="0" cy="0"/>
-        </a:xfrm>
-      </p:grpSpPr>
-      <p:sp useBgFill="1">
-        <p:nvSpPr>
-          <p:cNvPr id="135" name="Rectangle 134">
-            <a:extLst>
-              <a:ext uri="{FF2B5EF4-FFF2-40B4-BE49-F238E27FC236}">
-                <a16:creationId xmlns:a16="http://schemas.microsoft.com/office/drawing/2014/main" id="{CD62DB5A-5AA0-4E7E-94AB-AD20F02CA8DF}"/>
-              </a:ext>
-              <a:ext uri="{C183D7F6-B498-43B3-948B-1728B52AA6E4}">
-                <adec:decorative xmlns:adec="http://schemas.microsoft.com/office/drawing/2017/decorative" val="1"/>
-              </a:ext>
-            </a:extLst>
-          </p:cNvPr>
-          <p:cNvSpPr>
-            <a:spLocks noGrp="1" noRot="1" noChangeAspect="1" noMove="1" noResize="1" noEditPoints="1" noAdjustHandles="1" noChangeArrowheads="1" noChangeShapeType="1" noTextEdit="1"/>
-          </p:cNvSpPr>
-          <p:nvPr>
-            <p:extLst>
-              <p:ext uri="{386F3935-93C4-4BCD-93E2-E3B085C9AB24}">
-                <p16:designElem xmlns:p16="http://schemas.microsoft.com/office/powerpoint/2015/main" val="1"/>
-              </p:ext>
-            </p:extLst>
-          </p:nvPr>
-        </p:nvSpPr>
-        <p:spPr>
-          <a:xfrm>
-            <a:off x="3048" y="0"/>
-            <a:ext cx="12188952" cy="6858000"/>
-          </a:xfrm>
-          <a:prstGeom prst="rect">
-            <a:avLst/>
-          </a:prstGeom>
-          <a:ln>
-            <a:noFill/>
-          </a:ln>
-        </p:spPr>
-        <p:style>
-          <a:lnRef idx="2">
-            <a:schemeClr val="accent1">
-              <a:shade val="50000"/>
-            </a:schemeClr>
-          </a:lnRef>
-          <a:fillRef idx="1">
-            <a:schemeClr val="accent1"/>
-          </a:fillRef>
-          <a:effectRef idx="0">
-            <a:schemeClr val="accent1"/>
-          </a:effectRef>
-          <a:fontRef idx="minor">
-            <a:schemeClr val="lt1"/>
-          </a:fontRef>
-        </p:style>
-        <p:txBody>
-          <a:bodyPr rtlCol="0" anchor="ctr"/>
-          <a:lstStyle/>
-          <a:p>
-            <a:pPr algn="ctr"/>
-            <a:endParaRPr lang="en-US" sz="900" dirty="0">
-              <a:solidFill>
-                <a:schemeClr val="bg1"/>
-              </a:solidFill>
-              <a:latin typeface="+mj-lt"/>
-            </a:endParaRPr>
-          </a:p>
-        </p:txBody>
-      </p:sp>
-      <p:sp>
-        <p:nvSpPr>
-          <p:cNvPr id="137" name="Rectangle 136">
-            <a:extLst>
-              <a:ext uri="{FF2B5EF4-FFF2-40B4-BE49-F238E27FC236}">
-                <a16:creationId xmlns:a16="http://schemas.microsoft.com/office/drawing/2014/main" id="{0F086ECE-EF43-4B07-9DD0-59679471A067}"/>
-              </a:ext>
-              <a:ext uri="{C183D7F6-B498-43B3-948B-1728B52AA6E4}">
-                <adec:decorative xmlns:adec="http://schemas.microsoft.com/office/drawing/2017/decorative" val="1"/>
-              </a:ext>
-            </a:extLst>
-          </p:cNvPr>
-          <p:cNvSpPr>
-            <a:spLocks noGrp="1" noRot="1" noChangeAspect="1" noMove="1" noResize="1" noEditPoints="1" noAdjustHandles="1" noChangeArrowheads="1" noChangeShapeType="1" noTextEdit="1"/>
-          </p:cNvSpPr>
-          <p:nvPr>
-            <p:extLst>
-              <p:ext uri="{386F3935-93C4-4BCD-93E2-E3B085C9AB24}">
-                <p16:designElem xmlns:p16="http://schemas.microsoft.com/office/powerpoint/2015/main" val="1"/>
-              </p:ext>
-            </p:extLst>
-          </p:nvPr>
-        </p:nvSpPr>
-        <p:spPr>
-          <a:xfrm>
-            <a:off x="3048" y="0"/>
-            <a:ext cx="12188952" cy="6858000"/>
-          </a:xfrm>
-          <a:prstGeom prst="rect">
-            <a:avLst/>
-          </a:prstGeom>
-          <a:solidFill>
-            <a:schemeClr val="bg2">
-              <a:lumMod val="90000"/>
-              <a:lumOff val="10000"/>
-              <a:alpha val="90000"/>
-            </a:schemeClr>
-          </a:solidFill>
-          <a:ln>
-            <a:noFill/>
-          </a:ln>
-        </p:spPr>
-        <p:style>
-          <a:lnRef idx="2">
-            <a:schemeClr val="accent1">
-              <a:shade val="50000"/>
-            </a:schemeClr>
-          </a:lnRef>
-          <a:fillRef idx="1">
-            <a:schemeClr val="accent1"/>
-          </a:fillRef>
-          <a:effectRef idx="0">
-            <a:schemeClr val="accent1"/>
-          </a:effectRef>
-          <a:fontRef idx="minor">
-            <a:schemeClr val="lt1"/>
-          </a:fontRef>
-        </p:style>
-        <p:txBody>
-          <a:bodyPr rtlCol="0" anchor="ctr"/>
-          <a:lstStyle/>
-          <a:p>
-            <a:pPr algn="ctr"/>
-            <a:endParaRPr lang="en-US" sz="900" dirty="0">
-              <a:solidFill>
-                <a:schemeClr val="bg1"/>
-              </a:solidFill>
-              <a:latin typeface="+mj-lt"/>
-            </a:endParaRPr>
-          </a:p>
-        </p:txBody>
-      </p:sp>
-      <p:sp useBgFill="1">
-        <p:nvSpPr>
-          <p:cNvPr id="139" name="Rectangle 138">
-            <a:extLst>
-              <a:ext uri="{FF2B5EF4-FFF2-40B4-BE49-F238E27FC236}">
-                <a16:creationId xmlns:a16="http://schemas.microsoft.com/office/drawing/2014/main" id="{5DB84597-3185-4C7A-A2CB-6413E167EE86}"/>
-              </a:ext>
-              <a:ext uri="{C183D7F6-B498-43B3-948B-1728B52AA6E4}">
-                <adec:decorative xmlns:adec="http://schemas.microsoft.com/office/drawing/2017/decorative" val="1"/>
-              </a:ext>
-            </a:extLst>
-          </p:cNvPr>
-          <p:cNvSpPr>
-            <a:spLocks noGrp="1" noRot="1" noChangeAspect="1" noMove="1" noResize="1" noEditPoints="1" noAdjustHandles="1" noChangeArrowheads="1" noChangeShapeType="1" noTextEdit="1"/>
-          </p:cNvSpPr>
-          <p:nvPr>
-            <p:extLst>
-              <p:ext uri="{386F3935-93C4-4BCD-93E2-E3B085C9AB24}">
-                <p16:designElem xmlns:p16="http://schemas.microsoft.com/office/powerpoint/2015/main" val="1"/>
-              </p:ext>
-            </p:extLst>
-          </p:nvPr>
-        </p:nvSpPr>
-        <p:spPr>
-          <a:xfrm>
-            <a:off x="3048" y="0"/>
-            <a:ext cx="12188952" cy="6858000"/>
-          </a:xfrm>
-          <a:prstGeom prst="rect">
-            <a:avLst/>
-          </a:prstGeom>
-          <a:ln>
-            <a:noFill/>
-          </a:ln>
-        </p:spPr>
-        <p:style>
-          <a:lnRef idx="2">
-            <a:schemeClr val="accent1">
-              <a:shade val="50000"/>
-            </a:schemeClr>
-          </a:lnRef>
-          <a:fillRef idx="1">
-            <a:schemeClr val="accent1"/>
-          </a:fillRef>
-          <a:effectRef idx="0">
-            <a:schemeClr val="accent1"/>
-          </a:effectRef>
-          <a:fontRef idx="minor">
-            <a:schemeClr val="lt1"/>
-          </a:fontRef>
-        </p:style>
-        <p:txBody>
-          <a:bodyPr rtlCol="0" anchor="ctr"/>
-          <a:lstStyle/>
-          <a:p>
-            <a:pPr algn="ctr"/>
-            <a:endParaRPr lang="en-US" sz="900" dirty="0">
-              <a:solidFill>
-                <a:schemeClr val="bg1"/>
-              </a:solidFill>
-              <a:latin typeface="+mj-lt"/>
-            </a:endParaRPr>
-          </a:p>
-        </p:txBody>
-      </p:sp>
-      <p:sp useBgFill="1">
-        <p:nvSpPr>
-          <p:cNvPr id="141" name="Rectangle 140">
-            <a:extLst>
-              <a:ext uri="{FF2B5EF4-FFF2-40B4-BE49-F238E27FC236}">
-                <a16:creationId xmlns:a16="http://schemas.microsoft.com/office/drawing/2014/main" id="{94DA0203-BFB4-49DB-A205-51AD7549D42A}"/>
-              </a:ext>
-              <a:ext uri="{C183D7F6-B498-43B3-948B-1728B52AA6E4}">
-                <adec:decorative xmlns:adec="http://schemas.microsoft.com/office/drawing/2017/decorative" val="1"/>
-              </a:ext>
-            </a:extLst>
-          </p:cNvPr>
-          <p:cNvSpPr>
-            <a:spLocks noGrp="1" noRot="1" noChangeAspect="1" noMove="1" noResize="1" noEditPoints="1" noAdjustHandles="1" noChangeArrowheads="1" noChangeShapeType="1" noTextEdit="1"/>
-          </p:cNvSpPr>
-          <p:nvPr>
-            <p:extLst>
-              <p:ext uri="{386F3935-93C4-4BCD-93E2-E3B085C9AB24}">
-                <p16:designElem xmlns:p16="http://schemas.microsoft.com/office/powerpoint/2015/main" val="1"/>
-              </p:ext>
-            </p:extLst>
-          </p:nvPr>
-        </p:nvSpPr>
-        <p:spPr>
-          <a:xfrm>
-            <a:off x="0" y="0"/>
-            <a:ext cx="12192000" cy="6858000"/>
-          </a:xfrm>
-          <a:prstGeom prst="rect">
-            <a:avLst/>
-          </a:prstGeom>
-          <a:ln>
-            <a:noFill/>
-          </a:ln>
-        </p:spPr>
-        <p:style>
-          <a:lnRef idx="2">
-            <a:schemeClr val="accent1">
-              <a:shade val="50000"/>
-            </a:schemeClr>
-          </a:lnRef>
-          <a:fillRef idx="1">
-            <a:schemeClr val="accent1"/>
-          </a:fillRef>
-          <a:effectRef idx="0">
-            <a:schemeClr val="accent1"/>
-          </a:effectRef>
-          <a:fontRef idx="minor">
-            <a:schemeClr val="lt1"/>
-          </a:fontRef>
-        </p:style>
-        <p:txBody>
-          <a:bodyPr rtlCol="0" anchor="ctr"/>
-          <a:lstStyle/>
-          <a:p>
-            <a:pPr algn="ctr"/>
-            <a:endParaRPr lang="en-US" dirty="0">
-              <a:solidFill>
-                <a:schemeClr val="tx1">
-                  <a:lumMod val="65000"/>
-                  <a:lumOff val="35000"/>
-                </a:schemeClr>
-              </a:solidFill>
-              <a:latin typeface="AvenirNext LT Pro Medium" panose="020B0504020202020204" pitchFamily="34" charset="0"/>
-            </a:endParaRPr>
-          </a:p>
-        </p:txBody>
-      </p:sp>
-      <p:pic>
-        <p:nvPicPr>
-          <p:cNvPr id="1026" name="Picture 2" descr="Điểm danh top 5 phần mềm phân tích chứng khoán">
-            <a:extLst>
-              <a:ext uri="{FF2B5EF4-FFF2-40B4-BE49-F238E27FC236}">
-                <a16:creationId xmlns:a16="http://schemas.microsoft.com/office/drawing/2014/main" id="{0A431F1E-813C-99B8-B790-7CF6D4CC97EC}"/>
-              </a:ext>
-            </a:extLst>
-          </p:cNvPr>
-          <p:cNvPicPr>
-            <a:picLocks noChangeAspect="1" noChangeArrowheads="1"/>
-          </p:cNvPicPr>
-          <p:nvPr/>
-        </p:nvPicPr>
-        <p:blipFill rotWithShape="1">
-          <a:blip r:embed="rId2">
-            <a:alphaModFix/>
-            <a:extLst>
-              <a:ext uri="{28A0092B-C50C-407E-A947-70E740481C1C}">
-                <a14:useLocalDpi xmlns:a14="http://schemas.microsoft.com/office/drawing/2010/main" val="0"/>
-              </a:ext>
-            </a:extLst>
-          </a:blip>
-          <a:srcRect l="44"/>
-          <a:stretch/>
-        </p:blipFill>
-        <p:spPr bwMode="auto">
-          <a:xfrm>
-            <a:off x="5355" y="10"/>
-            <a:ext cx="12186645" cy="6857990"/>
-          </a:xfrm>
-          <a:prstGeom prst="rect">
-            <a:avLst/>
-          </a:prstGeom>
-          <a:noFill/>
-          <a:extLst>
-            <a:ext uri="{909E8E84-426E-40DD-AFC4-6F175D3DCCD1}">
-              <a14:hiddenFill xmlns:a14="http://schemas.microsoft.com/office/drawing/2010/main">
-                <a:solidFill>
-                  <a:srgbClr val="FFFFFF"/>
-                </a:solidFill>
-              </a14:hiddenFill>
-            </a:ext>
-          </a:extLst>
-        </p:spPr>
-      </p:pic>
-      <p:sp>
-        <p:nvSpPr>
-          <p:cNvPr id="143" name="Rectangle 142">
-            <a:extLst>
-              <a:ext uri="{FF2B5EF4-FFF2-40B4-BE49-F238E27FC236}">
-                <a16:creationId xmlns:a16="http://schemas.microsoft.com/office/drawing/2014/main" id="{652F1BB8-9F6C-45D6-898D-65348D26BFCC}"/>
-              </a:ext>
-              <a:ext uri="{C183D7F6-B498-43B3-948B-1728B52AA6E4}">
-                <adec:decorative xmlns:adec="http://schemas.microsoft.com/office/drawing/2017/decorative" val="1"/>
-              </a:ext>
-            </a:extLst>
-          </p:cNvPr>
-          <p:cNvSpPr>
-            <a:spLocks noGrp="1" noRot="1" noChangeAspect="1" noMove="1" noResize="1" noEditPoints="1" noAdjustHandles="1" noChangeArrowheads="1" noChangeShapeType="1" noTextEdit="1"/>
-          </p:cNvSpPr>
-          <p:nvPr>
-            <p:extLst>
-              <p:ext uri="{386F3935-93C4-4BCD-93E2-E3B085C9AB24}">
-                <p16:designElem xmlns:p16="http://schemas.microsoft.com/office/powerpoint/2015/main" val="1"/>
-              </p:ext>
-            </p:extLst>
-          </p:nvPr>
-        </p:nvSpPr>
-        <p:spPr>
-          <a:xfrm>
-            <a:off x="3048" y="0"/>
-            <a:ext cx="12188952" cy="4934465"/>
-          </a:xfrm>
-          <a:prstGeom prst="rect">
-            <a:avLst/>
-          </a:prstGeom>
-          <a:gradFill>
-            <a:gsLst>
-              <a:gs pos="100000">
-                <a:srgbClr val="000000">
-                  <a:alpha val="0"/>
-                </a:srgbClr>
-              </a:gs>
-              <a:gs pos="0">
-                <a:schemeClr val="tx1"/>
-              </a:gs>
-              <a:gs pos="0">
-                <a:srgbClr val="000000">
-                  <a:alpha val="70000"/>
-                </a:srgbClr>
-              </a:gs>
-            </a:gsLst>
-            <a:lin ang="5400000" scaled="1"/>
-          </a:gradFill>
-          <a:ln>
-            <a:noFill/>
-          </a:ln>
-        </p:spPr>
-        <p:style>
-          <a:lnRef idx="2">
-            <a:schemeClr val="accent1">
-              <a:shade val="50000"/>
-            </a:schemeClr>
-          </a:lnRef>
-          <a:fillRef idx="1">
-            <a:schemeClr val="accent1"/>
-          </a:fillRef>
-          <a:effectRef idx="0">
-            <a:schemeClr val="accent1"/>
-          </a:effectRef>
-          <a:fontRef idx="minor">
-            <a:schemeClr val="lt1"/>
-          </a:fontRef>
-        </p:style>
-        <p:txBody>
-          <a:bodyPr rtlCol="0" anchor="ctr"/>
-          <a:lstStyle/>
-          <a:p>
-            <a:pPr algn="ctr"/>
-            <a:endParaRPr lang="en-US"/>
-          </a:p>
-        </p:txBody>
-      </p:sp>
-      <p:sp>
-        <p:nvSpPr>
-          <p:cNvPr id="2" name="Title 1">
-            <a:extLst>
-              <a:ext uri="{FF2B5EF4-FFF2-40B4-BE49-F238E27FC236}">
-                <a16:creationId xmlns:a16="http://schemas.microsoft.com/office/drawing/2014/main" id="{1271C3EB-EC29-59C7-8282-18B14EE0A947}"/>
-              </a:ext>
-            </a:extLst>
-          </p:cNvPr>
-          <p:cNvSpPr>
-            <a:spLocks noGrp="1"/>
-          </p:cNvSpPr>
-          <p:nvPr>
-            <p:ph type="title"/>
-          </p:nvPr>
-        </p:nvSpPr>
-        <p:spPr>
-          <a:xfrm>
-            <a:off x="777240" y="1143294"/>
-            <a:ext cx="9923708" cy="1020188"/>
-          </a:xfrm>
-        </p:spPr>
-        <p:txBody>
-          <a:bodyPr vert="horz" lIns="91440" tIns="45720" rIns="91440" bIns="45720" rtlCol="0" anchor="t">
-            <a:normAutofit/>
-          </a:bodyPr>
-          <a:lstStyle/>
-          <a:p>
-            <a:r>
-              <a:rPr lang="en-US" sz="6000">
-                <a:solidFill>
-                  <a:srgbClr val="FFFFFF"/>
-                </a:solidFill>
-              </a:rPr>
-              <a:t>App Tham Khảo</a:t>
-            </a:r>
-          </a:p>
-        </p:txBody>
-      </p:sp>
-    </p:spTree>
-    <p:extLst>
-      <p:ext uri="{BB962C8B-B14F-4D97-AF65-F5344CB8AC3E}">
-        <p14:creationId xmlns:p14="http://schemas.microsoft.com/office/powerpoint/2010/main" val="1941861796"/>
-      </p:ext>
-    </p:extLst>
-  </p:cSld>
-  <p:clrMapOvr>
-    <a:masterClrMapping/>
-  </p:clrMapOvr>
-  <p:timing>
-    <p:tnLst>
-      <p:par>
-        <p:cTn id="1" dur="indefinite" restart="never" nodeType="tmRoot">
-          <p:childTnLst>
-            <p:seq concurrent="1" nextAc="seek">
-              <p:cTn id="2" dur="indefinite" nodeType="mainSeq">
-                <p:childTnLst>
-                  <p:par>
-                    <p:cTn id="3" fill="hold">
-                      <p:stCondLst>
-                        <p:cond delay="indefinite"/>
-                        <p:cond evt="onBegin" delay="0">
-                          <p:tn val="2"/>
-                        </p:cond>
-                      </p:stCondLst>
-                      <p:childTnLst>
-                        <p:par>
-                          <p:cTn id="4" fill="hold">
-                            <p:stCondLst>
-                              <p:cond delay="0"/>
-                            </p:stCondLst>
-                            <p:childTnLst>
-                              <p:par>
-                                <p:cTn id="5" presetID="10" presetClass="entr" presetSubtype="0" fill="hold" grpId="0" nodeType="withEffect">
-                                  <p:stCondLst>
-                                    <p:cond delay="1000"/>
-                                  </p:stCondLst>
-                                  <p:iterate type="lt">
-                                    <p:tmPct val="10000"/>
-                                  </p:iterate>
-                                  <p:childTnLst>
-                                    <p:set>
-                                      <p:cBhvr>
-                                        <p:cTn id="6" dur="1" fill="hold">
-                                          <p:stCondLst>
-                                            <p:cond delay="0"/>
-                                          </p:stCondLst>
-                                        </p:cTn>
-                                        <p:tgtEl>
-                                          <p:spTgt spid="2"/>
-                                        </p:tgtEl>
-                                        <p:attrNameLst>
-                                          <p:attrName>style.visibility</p:attrName>
-                                        </p:attrNameLst>
-                                      </p:cBhvr>
-                                      <p:to>
-                                        <p:strVal val="visible"/>
-                                      </p:to>
-                                    </p:set>
-                                    <p:animEffect transition="in" filter="fade">
-                                      <p:cBhvr>
-                                        <p:cTn id="7" dur="400"/>
                                         <p:tgtEl>
                                           <p:spTgt spid="2"/>
                                         </p:tgtEl>

</xml_diff>